<commit_message>
Added DB for Home and Profile
Home and Profile now reads from the DB and not from the tempDB
</commit_message>
<xml_diff>
--- a/Official/MCO Design.pptx
+++ b/Official/MCO Design.pptx
@@ -5521,6 +5521,42 @@
         </a:p>
       </dgm:t>
     </dgm:pt>
+    <dgm:pt modelId="{FBAC9C05-519A-4AB7-B985-D9BE1A39A0B1}">
+      <dgm:prSet phldrT="[Text]"/>
+      <dgm:spPr/>
+      <dgm:t>
+        <a:bodyPr/>
+        <a:lstStyle/>
+        <a:p>
+          <a:r>
+            <a:rPr lang="en-PH" i="0" u="none" dirty="0"/>
+            <a:t>GET: /home/search/&lt;search&gt;</a:t>
+          </a:r>
+        </a:p>
+      </dgm:t>
+    </dgm:pt>
+    <dgm:pt modelId="{579C73EA-AC1B-47D0-8426-C21255916998}" type="parTrans" cxnId="{FD077AD2-0BF3-4EFB-91F6-46E700E229BB}">
+      <dgm:prSet/>
+      <dgm:spPr/>
+      <dgm:t>
+        <a:bodyPr/>
+        <a:lstStyle/>
+        <a:p>
+          <a:endParaRPr lang="en-PH"/>
+        </a:p>
+      </dgm:t>
+    </dgm:pt>
+    <dgm:pt modelId="{C09F2730-84BE-44BA-B0A5-5D57ACB94EC0}" type="sibTrans" cxnId="{FD077AD2-0BF3-4EFB-91F6-46E700E229BB}">
+      <dgm:prSet/>
+      <dgm:spPr/>
+      <dgm:t>
+        <a:bodyPr/>
+        <a:lstStyle/>
+        <a:p>
+          <a:endParaRPr lang="en-PH"/>
+        </a:p>
+      </dgm:t>
+    </dgm:pt>
     <dgm:pt modelId="{5F3FAA4C-44A3-470C-81C5-23BB7113FF75}" type="pres">
       <dgm:prSet presAssocID="{34BEB75E-ED6D-4113-9F50-1BF5F1954990}" presName="hierChild1" presStyleCnt="0">
         <dgm:presLayoutVars>
@@ -5595,7 +5631,7 @@
       <dgm:spPr/>
     </dgm:pt>
     <dgm:pt modelId="{32554A9C-FE4D-43F7-AEE1-C54D9D75C200}" type="pres">
-      <dgm:prSet presAssocID="{E8EB6F71-72ED-410E-A6D6-688CC4C8622F}" presName="Name37" presStyleLbl="parChTrans1D3" presStyleIdx="0" presStyleCnt="13"/>
+      <dgm:prSet presAssocID="{E8EB6F71-72ED-410E-A6D6-688CC4C8622F}" presName="Name37" presStyleLbl="parChTrans1D3" presStyleIdx="0" presStyleCnt="14"/>
       <dgm:spPr/>
     </dgm:pt>
     <dgm:pt modelId="{B90CC990-B130-4339-9559-D69CF90E88B4}" type="pres">
@@ -5611,7 +5647,7 @@
       <dgm:spPr/>
     </dgm:pt>
     <dgm:pt modelId="{3C293340-5887-41DE-859C-77675150C6EB}" type="pres">
-      <dgm:prSet presAssocID="{028C5DFA-CD08-425A-9808-BE49C21D580B}" presName="rootText" presStyleLbl="node3" presStyleIdx="0" presStyleCnt="13">
+      <dgm:prSet presAssocID="{028C5DFA-CD08-425A-9808-BE49C21D580B}" presName="rootText" presStyleLbl="node3" presStyleIdx="0" presStyleCnt="14">
         <dgm:presLayoutVars>
           <dgm:chPref val="3"/>
         </dgm:presLayoutVars>
@@ -5619,7 +5655,7 @@
       <dgm:spPr/>
     </dgm:pt>
     <dgm:pt modelId="{31730A28-5687-49A7-9084-9821AA2323E9}" type="pres">
-      <dgm:prSet presAssocID="{028C5DFA-CD08-425A-9808-BE49C21D580B}" presName="rootConnector" presStyleLbl="node3" presStyleIdx="0" presStyleCnt="13"/>
+      <dgm:prSet presAssocID="{028C5DFA-CD08-425A-9808-BE49C21D580B}" presName="rootConnector" presStyleLbl="node3" presStyleIdx="0" presStyleCnt="14"/>
       <dgm:spPr/>
     </dgm:pt>
     <dgm:pt modelId="{854997E6-49AF-48D8-846F-0DF8A234610E}" type="pres">
@@ -5667,7 +5703,7 @@
       <dgm:spPr/>
     </dgm:pt>
     <dgm:pt modelId="{FC1B4037-826A-4F44-80EE-641936EF98B7}" type="pres">
-      <dgm:prSet presAssocID="{0E41C96E-49F8-4F4A-AF74-A981293F785F}" presName="Name37" presStyleLbl="parChTrans1D3" presStyleIdx="1" presStyleCnt="13"/>
+      <dgm:prSet presAssocID="{0E41C96E-49F8-4F4A-AF74-A981293F785F}" presName="Name37" presStyleLbl="parChTrans1D3" presStyleIdx="1" presStyleCnt="14"/>
       <dgm:spPr/>
     </dgm:pt>
     <dgm:pt modelId="{3B7362A0-4644-4129-AD8D-83D094010059}" type="pres">
@@ -5683,7 +5719,7 @@
       <dgm:spPr/>
     </dgm:pt>
     <dgm:pt modelId="{5CEACDA1-7667-40A9-B874-25D1B1E21A99}" type="pres">
-      <dgm:prSet presAssocID="{332EBDA1-FC91-42DD-8C1E-2C7B445019B3}" presName="rootText" presStyleLbl="node3" presStyleIdx="1" presStyleCnt="13">
+      <dgm:prSet presAssocID="{332EBDA1-FC91-42DD-8C1E-2C7B445019B3}" presName="rootText" presStyleLbl="node3" presStyleIdx="1" presStyleCnt="14">
         <dgm:presLayoutVars>
           <dgm:chPref val="3"/>
         </dgm:presLayoutVars>
@@ -5691,7 +5727,7 @@
       <dgm:spPr/>
     </dgm:pt>
     <dgm:pt modelId="{1F530FFE-35D1-4609-8D1C-CEEB0EF8690E}" type="pres">
-      <dgm:prSet presAssocID="{332EBDA1-FC91-42DD-8C1E-2C7B445019B3}" presName="rootConnector" presStyleLbl="node3" presStyleIdx="1" presStyleCnt="13"/>
+      <dgm:prSet presAssocID="{332EBDA1-FC91-42DD-8C1E-2C7B445019B3}" presName="rootConnector" presStyleLbl="node3" presStyleIdx="1" presStyleCnt="14"/>
       <dgm:spPr/>
     </dgm:pt>
     <dgm:pt modelId="{681C3D72-8919-4649-B5A8-1D83A3949CB2}" type="pres">
@@ -5738,6 +5774,42 @@
       <dgm:prSet presAssocID="{44363CFA-628E-4026-88F3-8868490E44F8}" presName="hierChild4" presStyleCnt="0"/>
       <dgm:spPr/>
     </dgm:pt>
+    <dgm:pt modelId="{CD070373-8DF7-435C-92DB-D4837DF76FC3}" type="pres">
+      <dgm:prSet presAssocID="{579C73EA-AC1B-47D0-8426-C21255916998}" presName="Name37" presStyleLbl="parChTrans1D3" presStyleIdx="2" presStyleCnt="14"/>
+      <dgm:spPr/>
+    </dgm:pt>
+    <dgm:pt modelId="{57A23413-0351-4B01-B143-DF45D03C6A89}" type="pres">
+      <dgm:prSet presAssocID="{FBAC9C05-519A-4AB7-B985-D9BE1A39A0B1}" presName="hierRoot2" presStyleCnt="0">
+        <dgm:presLayoutVars>
+          <dgm:hierBranch val="init"/>
+        </dgm:presLayoutVars>
+      </dgm:prSet>
+      <dgm:spPr/>
+    </dgm:pt>
+    <dgm:pt modelId="{43C637BB-C0F7-48B7-BCB5-4C46ED31DC73}" type="pres">
+      <dgm:prSet presAssocID="{FBAC9C05-519A-4AB7-B985-D9BE1A39A0B1}" presName="rootComposite" presStyleCnt="0"/>
+      <dgm:spPr/>
+    </dgm:pt>
+    <dgm:pt modelId="{7BD205D8-B95D-44F8-9394-3A803C3AE7E3}" type="pres">
+      <dgm:prSet presAssocID="{FBAC9C05-519A-4AB7-B985-D9BE1A39A0B1}" presName="rootText" presStyleLbl="node3" presStyleIdx="2" presStyleCnt="14">
+        <dgm:presLayoutVars>
+          <dgm:chPref val="3"/>
+        </dgm:presLayoutVars>
+      </dgm:prSet>
+      <dgm:spPr/>
+    </dgm:pt>
+    <dgm:pt modelId="{390062A8-6670-4F37-9397-41D8E8C03E2B}" type="pres">
+      <dgm:prSet presAssocID="{FBAC9C05-519A-4AB7-B985-D9BE1A39A0B1}" presName="rootConnector" presStyleLbl="node3" presStyleIdx="2" presStyleCnt="14"/>
+      <dgm:spPr/>
+    </dgm:pt>
+    <dgm:pt modelId="{093E2217-0455-4C34-BA46-E099CA2EAF49}" type="pres">
+      <dgm:prSet presAssocID="{FBAC9C05-519A-4AB7-B985-D9BE1A39A0B1}" presName="hierChild4" presStyleCnt="0"/>
+      <dgm:spPr/>
+    </dgm:pt>
+    <dgm:pt modelId="{2EF7E96D-2F1E-468B-90A0-927051DAC862}" type="pres">
+      <dgm:prSet presAssocID="{FBAC9C05-519A-4AB7-B985-D9BE1A39A0B1}" presName="hierChild5" presStyleCnt="0"/>
+      <dgm:spPr/>
+    </dgm:pt>
     <dgm:pt modelId="{2B358511-A0D0-46D9-8267-856248CA4EE9}" type="pres">
       <dgm:prSet presAssocID="{44363CFA-628E-4026-88F3-8868490E44F8}" presName="hierChild5" presStyleCnt="0"/>
       <dgm:spPr/>
@@ -5775,7 +5847,7 @@
       <dgm:spPr/>
     </dgm:pt>
     <dgm:pt modelId="{104BA3A7-D652-47E4-9B20-83BB4665DF76}" type="pres">
-      <dgm:prSet presAssocID="{BF950D71-5670-40D6-AC0F-099BAE4EAFCE}" presName="Name37" presStyleLbl="parChTrans1D3" presStyleIdx="2" presStyleCnt="13"/>
+      <dgm:prSet presAssocID="{BF950D71-5670-40D6-AC0F-099BAE4EAFCE}" presName="Name37" presStyleLbl="parChTrans1D3" presStyleIdx="3" presStyleCnt="14"/>
       <dgm:spPr/>
     </dgm:pt>
     <dgm:pt modelId="{531B9504-8DE6-4712-98FE-50F6F2431DE0}" type="pres">
@@ -5791,7 +5863,7 @@
       <dgm:spPr/>
     </dgm:pt>
     <dgm:pt modelId="{7F097E5B-6209-4AF0-8ED0-402082DA0749}" type="pres">
-      <dgm:prSet presAssocID="{3C6EA423-D64F-4DC7-B184-24C9BC3512E8}" presName="rootText" presStyleLbl="node3" presStyleIdx="2" presStyleCnt="13">
+      <dgm:prSet presAssocID="{3C6EA423-D64F-4DC7-B184-24C9BC3512E8}" presName="rootText" presStyleLbl="node3" presStyleIdx="3" presStyleCnt="14">
         <dgm:presLayoutVars>
           <dgm:chPref val="3"/>
         </dgm:presLayoutVars>
@@ -5799,7 +5871,7 @@
       <dgm:spPr/>
     </dgm:pt>
     <dgm:pt modelId="{6326AB10-BB5C-4854-9D21-95B3803C563E}" type="pres">
-      <dgm:prSet presAssocID="{3C6EA423-D64F-4DC7-B184-24C9BC3512E8}" presName="rootConnector" presStyleLbl="node3" presStyleIdx="2" presStyleCnt="13"/>
+      <dgm:prSet presAssocID="{3C6EA423-D64F-4DC7-B184-24C9BC3512E8}" presName="rootConnector" presStyleLbl="node3" presStyleIdx="3" presStyleCnt="14"/>
       <dgm:spPr/>
     </dgm:pt>
     <dgm:pt modelId="{25A49672-0356-4BA3-BAB1-ADB32D08F479}" type="pres">
@@ -5811,7 +5883,7 @@
       <dgm:spPr/>
     </dgm:pt>
     <dgm:pt modelId="{246DDF7E-D086-468F-AD98-C5A107AC1D5D}" type="pres">
-      <dgm:prSet presAssocID="{B9579491-E72E-41C5-854B-F50C3EB1B30B}" presName="Name37" presStyleLbl="parChTrans1D3" presStyleIdx="3" presStyleCnt="13"/>
+      <dgm:prSet presAssocID="{B9579491-E72E-41C5-854B-F50C3EB1B30B}" presName="Name37" presStyleLbl="parChTrans1D3" presStyleIdx="4" presStyleCnt="14"/>
       <dgm:spPr/>
     </dgm:pt>
     <dgm:pt modelId="{CCBEDB89-BBC0-4E76-85D0-33739605D6D2}" type="pres">
@@ -5827,7 +5899,7 @@
       <dgm:spPr/>
     </dgm:pt>
     <dgm:pt modelId="{E50F9959-464F-43F9-8195-9C82C537826B}" type="pres">
-      <dgm:prSet presAssocID="{F1DABE6E-F8F2-4453-9AF1-0A543F993768}" presName="rootText" presStyleLbl="node3" presStyleIdx="3" presStyleCnt="13">
+      <dgm:prSet presAssocID="{F1DABE6E-F8F2-4453-9AF1-0A543F993768}" presName="rootText" presStyleLbl="node3" presStyleIdx="4" presStyleCnt="14">
         <dgm:presLayoutVars>
           <dgm:chPref val="3"/>
         </dgm:presLayoutVars>
@@ -5835,7 +5907,7 @@
       <dgm:spPr/>
     </dgm:pt>
     <dgm:pt modelId="{29A7D2B3-E83F-48D3-BA82-6C1B33C7D117}" type="pres">
-      <dgm:prSet presAssocID="{F1DABE6E-F8F2-4453-9AF1-0A543F993768}" presName="rootConnector" presStyleLbl="node3" presStyleIdx="3" presStyleCnt="13"/>
+      <dgm:prSet presAssocID="{F1DABE6E-F8F2-4453-9AF1-0A543F993768}" presName="rootConnector" presStyleLbl="node3" presStyleIdx="4" presStyleCnt="14"/>
       <dgm:spPr/>
     </dgm:pt>
     <dgm:pt modelId="{3F8B49D1-1470-4AFD-996C-55991B6E6161}" type="pres">
@@ -5847,7 +5919,7 @@
       <dgm:spPr/>
     </dgm:pt>
     <dgm:pt modelId="{F07C89FB-7AC0-4D6A-BF40-C0070FED0EE3}" type="pres">
-      <dgm:prSet presAssocID="{423859FD-096E-4927-9390-25344E903FBF}" presName="Name37" presStyleLbl="parChTrans1D3" presStyleIdx="4" presStyleCnt="13"/>
+      <dgm:prSet presAssocID="{423859FD-096E-4927-9390-25344E903FBF}" presName="Name37" presStyleLbl="parChTrans1D3" presStyleIdx="5" presStyleCnt="14"/>
       <dgm:spPr/>
     </dgm:pt>
     <dgm:pt modelId="{B5323093-C52B-4762-88CA-EB05C45B59E6}" type="pres">
@@ -5863,7 +5935,7 @@
       <dgm:spPr/>
     </dgm:pt>
     <dgm:pt modelId="{B99F24ED-3BC7-432A-B386-E1A66BAEF726}" type="pres">
-      <dgm:prSet presAssocID="{A1C6BA05-AD07-4670-B0CD-118E17FA1993}" presName="rootText" presStyleLbl="node3" presStyleIdx="4" presStyleCnt="13">
+      <dgm:prSet presAssocID="{A1C6BA05-AD07-4670-B0CD-118E17FA1993}" presName="rootText" presStyleLbl="node3" presStyleIdx="5" presStyleCnt="14">
         <dgm:presLayoutVars>
           <dgm:chPref val="3"/>
         </dgm:presLayoutVars>
@@ -5871,7 +5943,7 @@
       <dgm:spPr/>
     </dgm:pt>
     <dgm:pt modelId="{19FABE79-F8A2-4566-9B89-1E2FB5DFB7A6}" type="pres">
-      <dgm:prSet presAssocID="{A1C6BA05-AD07-4670-B0CD-118E17FA1993}" presName="rootConnector" presStyleLbl="node3" presStyleIdx="4" presStyleCnt="13"/>
+      <dgm:prSet presAssocID="{A1C6BA05-AD07-4670-B0CD-118E17FA1993}" presName="rootConnector" presStyleLbl="node3" presStyleIdx="5" presStyleCnt="14"/>
       <dgm:spPr/>
     </dgm:pt>
     <dgm:pt modelId="{96062C70-76CB-46F2-A12D-7691F85D67F8}" type="pres">
@@ -5883,7 +5955,7 @@
       <dgm:spPr/>
     </dgm:pt>
     <dgm:pt modelId="{ED24999A-CB54-48D6-8528-2545D016E1D3}" type="pres">
-      <dgm:prSet presAssocID="{57A8CB2D-79BE-4C74-9A37-D6A913DE1B82}" presName="Name37" presStyleLbl="parChTrans1D3" presStyleIdx="5" presStyleCnt="13"/>
+      <dgm:prSet presAssocID="{57A8CB2D-79BE-4C74-9A37-D6A913DE1B82}" presName="Name37" presStyleLbl="parChTrans1D3" presStyleIdx="6" presStyleCnt="14"/>
       <dgm:spPr/>
     </dgm:pt>
     <dgm:pt modelId="{C220EF82-2A32-455B-B92E-AB4AE94BE50C}" type="pres">
@@ -5899,7 +5971,7 @@
       <dgm:spPr/>
     </dgm:pt>
     <dgm:pt modelId="{1B492F86-1603-4E21-B660-DA6307964BAD}" type="pres">
-      <dgm:prSet presAssocID="{305846AD-47C4-463B-9DBE-6AA8AAAFD9CA}" presName="rootText" presStyleLbl="node3" presStyleIdx="5" presStyleCnt="13">
+      <dgm:prSet presAssocID="{305846AD-47C4-463B-9DBE-6AA8AAAFD9CA}" presName="rootText" presStyleLbl="node3" presStyleIdx="6" presStyleCnt="14">
         <dgm:presLayoutVars>
           <dgm:chPref val="3"/>
         </dgm:presLayoutVars>
@@ -5907,7 +5979,7 @@
       <dgm:spPr/>
     </dgm:pt>
     <dgm:pt modelId="{166FE553-CB8C-48D6-822E-56CDBDF78666}" type="pres">
-      <dgm:prSet presAssocID="{305846AD-47C4-463B-9DBE-6AA8AAAFD9CA}" presName="rootConnector" presStyleLbl="node3" presStyleIdx="5" presStyleCnt="13"/>
+      <dgm:prSet presAssocID="{305846AD-47C4-463B-9DBE-6AA8AAAFD9CA}" presName="rootConnector" presStyleLbl="node3" presStyleIdx="6" presStyleCnt="14"/>
       <dgm:spPr/>
     </dgm:pt>
     <dgm:pt modelId="{EDD082AB-8072-49AE-821E-1F6D02B72C2A}" type="pres">
@@ -5919,7 +5991,7 @@
       <dgm:spPr/>
     </dgm:pt>
     <dgm:pt modelId="{E4F616C8-77CD-4807-B795-EDC2BC3DD8F2}" type="pres">
-      <dgm:prSet presAssocID="{967C17FD-B87B-4CD0-BD44-345E2E5D2EA3}" presName="Name37" presStyleLbl="parChTrans1D3" presStyleIdx="6" presStyleCnt="13"/>
+      <dgm:prSet presAssocID="{967C17FD-B87B-4CD0-BD44-345E2E5D2EA3}" presName="Name37" presStyleLbl="parChTrans1D3" presStyleIdx="7" presStyleCnt="14"/>
       <dgm:spPr/>
     </dgm:pt>
     <dgm:pt modelId="{97BCDE9B-FA44-4866-B9CD-42F4D28FC57C}" type="pres">
@@ -5935,7 +6007,7 @@
       <dgm:spPr/>
     </dgm:pt>
     <dgm:pt modelId="{26976F64-C724-4705-94F5-0E6CD971C2E4}" type="pres">
-      <dgm:prSet presAssocID="{DE023E0B-5C31-4E35-A101-3DA3908C072F}" presName="rootText" presStyleLbl="node3" presStyleIdx="6" presStyleCnt="13">
+      <dgm:prSet presAssocID="{DE023E0B-5C31-4E35-A101-3DA3908C072F}" presName="rootText" presStyleLbl="node3" presStyleIdx="7" presStyleCnt="14">
         <dgm:presLayoutVars>
           <dgm:chPref val="3"/>
         </dgm:presLayoutVars>
@@ -5943,7 +6015,7 @@
       <dgm:spPr/>
     </dgm:pt>
     <dgm:pt modelId="{F5DA5587-5EB1-405E-8951-92F671AE6BE5}" type="pres">
-      <dgm:prSet presAssocID="{DE023E0B-5C31-4E35-A101-3DA3908C072F}" presName="rootConnector" presStyleLbl="node3" presStyleIdx="6" presStyleCnt="13"/>
+      <dgm:prSet presAssocID="{DE023E0B-5C31-4E35-A101-3DA3908C072F}" presName="rootConnector" presStyleLbl="node3" presStyleIdx="7" presStyleCnt="14"/>
       <dgm:spPr/>
     </dgm:pt>
     <dgm:pt modelId="{0BACCB52-5846-4B4E-82B3-B705AA185DE8}" type="pres">
@@ -5955,7 +6027,7 @@
       <dgm:spPr/>
     </dgm:pt>
     <dgm:pt modelId="{72D06BF6-42C5-434C-92ED-F618F0FF3B5A}" type="pres">
-      <dgm:prSet presAssocID="{7CF047C5-7A21-4DCA-910B-CBEC1AA93BA9}" presName="Name37" presStyleLbl="parChTrans1D3" presStyleIdx="7" presStyleCnt="13"/>
+      <dgm:prSet presAssocID="{7CF047C5-7A21-4DCA-910B-CBEC1AA93BA9}" presName="Name37" presStyleLbl="parChTrans1D3" presStyleIdx="8" presStyleCnt="14"/>
       <dgm:spPr/>
     </dgm:pt>
     <dgm:pt modelId="{7CE87129-122F-415D-9687-B4831C7BAD6B}" type="pres">
@@ -5971,7 +6043,7 @@
       <dgm:spPr/>
     </dgm:pt>
     <dgm:pt modelId="{50EC3807-8481-4C01-82B7-F19C2342E1A0}" type="pres">
-      <dgm:prSet presAssocID="{10F04DDC-9425-470F-8153-E7CB032EC473}" presName="rootText" presStyleLbl="node3" presStyleIdx="7" presStyleCnt="13">
+      <dgm:prSet presAssocID="{10F04DDC-9425-470F-8153-E7CB032EC473}" presName="rootText" presStyleLbl="node3" presStyleIdx="8" presStyleCnt="14">
         <dgm:presLayoutVars>
           <dgm:chPref val="3"/>
         </dgm:presLayoutVars>
@@ -5979,7 +6051,7 @@
       <dgm:spPr/>
     </dgm:pt>
     <dgm:pt modelId="{274E767F-761A-4B30-B369-389DF89B937D}" type="pres">
-      <dgm:prSet presAssocID="{10F04DDC-9425-470F-8153-E7CB032EC473}" presName="rootConnector" presStyleLbl="node3" presStyleIdx="7" presStyleCnt="13"/>
+      <dgm:prSet presAssocID="{10F04DDC-9425-470F-8153-E7CB032EC473}" presName="rootConnector" presStyleLbl="node3" presStyleIdx="8" presStyleCnt="14"/>
       <dgm:spPr/>
     </dgm:pt>
     <dgm:pt modelId="{4A3801EA-4E87-4854-89D0-F5EE8C40E870}" type="pres">
@@ -5991,7 +6063,7 @@
       <dgm:spPr/>
     </dgm:pt>
     <dgm:pt modelId="{A3F9BD0E-C624-4151-9767-64BBD33870D8}" type="pres">
-      <dgm:prSet presAssocID="{341C93D3-8A95-4DFB-AA9D-C38CA282C9E7}" presName="Name37" presStyleLbl="parChTrans1D3" presStyleIdx="8" presStyleCnt="13"/>
+      <dgm:prSet presAssocID="{341C93D3-8A95-4DFB-AA9D-C38CA282C9E7}" presName="Name37" presStyleLbl="parChTrans1D3" presStyleIdx="9" presStyleCnt="14"/>
       <dgm:spPr/>
     </dgm:pt>
     <dgm:pt modelId="{F2908DFE-90E6-4506-8F75-EC087EFF2791}" type="pres">
@@ -6007,7 +6079,7 @@
       <dgm:spPr/>
     </dgm:pt>
     <dgm:pt modelId="{FE90803F-BB98-472A-87D1-B85B7689304F}" type="pres">
-      <dgm:prSet presAssocID="{10948DB9-C87A-4CB4-AA25-2159E53038FA}" presName="rootText" presStyleLbl="node3" presStyleIdx="8" presStyleCnt="13">
+      <dgm:prSet presAssocID="{10948DB9-C87A-4CB4-AA25-2159E53038FA}" presName="rootText" presStyleLbl="node3" presStyleIdx="9" presStyleCnt="14">
         <dgm:presLayoutVars>
           <dgm:chPref val="3"/>
         </dgm:presLayoutVars>
@@ -6015,7 +6087,7 @@
       <dgm:spPr/>
     </dgm:pt>
     <dgm:pt modelId="{BEB1E389-DC78-4834-98AF-B72FEAAD2902}" type="pres">
-      <dgm:prSet presAssocID="{10948DB9-C87A-4CB4-AA25-2159E53038FA}" presName="rootConnector" presStyleLbl="node3" presStyleIdx="8" presStyleCnt="13"/>
+      <dgm:prSet presAssocID="{10948DB9-C87A-4CB4-AA25-2159E53038FA}" presName="rootConnector" presStyleLbl="node3" presStyleIdx="9" presStyleCnt="14"/>
       <dgm:spPr/>
     </dgm:pt>
     <dgm:pt modelId="{ACA86701-4A36-495A-A1A1-9DC9B364DF9A}" type="pres">
@@ -6063,7 +6135,7 @@
       <dgm:spPr/>
     </dgm:pt>
     <dgm:pt modelId="{206209FB-F600-4BD1-9606-121E90963E67}" type="pres">
-      <dgm:prSet presAssocID="{0ED2AB80-1B48-415F-BD87-852714594E12}" presName="Name37" presStyleLbl="parChTrans1D3" presStyleIdx="9" presStyleCnt="13"/>
+      <dgm:prSet presAssocID="{0ED2AB80-1B48-415F-BD87-852714594E12}" presName="Name37" presStyleLbl="parChTrans1D3" presStyleIdx="10" presStyleCnt="14"/>
       <dgm:spPr/>
     </dgm:pt>
     <dgm:pt modelId="{9D94A714-C145-4F55-BF39-E82CC94072CD}" type="pres">
@@ -6079,7 +6151,7 @@
       <dgm:spPr/>
     </dgm:pt>
     <dgm:pt modelId="{B15B783C-17E1-46DC-B52E-C2A7EDCDDBF6}" type="pres">
-      <dgm:prSet presAssocID="{785ADFEC-7668-46D6-9578-5377B24474CF}" presName="rootText" presStyleLbl="node3" presStyleIdx="9" presStyleCnt="13">
+      <dgm:prSet presAssocID="{785ADFEC-7668-46D6-9578-5377B24474CF}" presName="rootText" presStyleLbl="node3" presStyleIdx="10" presStyleCnt="14">
         <dgm:presLayoutVars>
           <dgm:chPref val="3"/>
         </dgm:presLayoutVars>
@@ -6087,7 +6159,7 @@
       <dgm:spPr/>
     </dgm:pt>
     <dgm:pt modelId="{43888EB2-C238-4AB3-84EF-EB4C21FE5D9D}" type="pres">
-      <dgm:prSet presAssocID="{785ADFEC-7668-46D6-9578-5377B24474CF}" presName="rootConnector" presStyleLbl="node3" presStyleIdx="9" presStyleCnt="13"/>
+      <dgm:prSet presAssocID="{785ADFEC-7668-46D6-9578-5377B24474CF}" presName="rootConnector" presStyleLbl="node3" presStyleIdx="10" presStyleCnt="14"/>
       <dgm:spPr/>
     </dgm:pt>
     <dgm:pt modelId="{1D44AC0C-5EFA-40AA-A409-4132EDAC6BF1}" type="pres">
@@ -6135,7 +6207,7 @@
       <dgm:spPr/>
     </dgm:pt>
     <dgm:pt modelId="{865CC225-A0DA-47E2-8F93-648401CE5D35}" type="pres">
-      <dgm:prSet presAssocID="{42168C56-2F22-4C47-AD41-80714FFDE7B7}" presName="Name37" presStyleLbl="parChTrans1D3" presStyleIdx="10" presStyleCnt="13"/>
+      <dgm:prSet presAssocID="{42168C56-2F22-4C47-AD41-80714FFDE7B7}" presName="Name37" presStyleLbl="parChTrans1D3" presStyleIdx="11" presStyleCnt="14"/>
       <dgm:spPr/>
     </dgm:pt>
     <dgm:pt modelId="{70E78AA5-44C3-4381-958B-78CB23EBFFCE}" type="pres">
@@ -6151,7 +6223,7 @@
       <dgm:spPr/>
     </dgm:pt>
     <dgm:pt modelId="{CC33A293-E3CB-411D-9632-6FE6954F9F3F}" type="pres">
-      <dgm:prSet presAssocID="{4DE3A42A-E3CE-4E99-83D9-D1A6756B3CB9}" presName="rootText" presStyleLbl="node3" presStyleIdx="10" presStyleCnt="13">
+      <dgm:prSet presAssocID="{4DE3A42A-E3CE-4E99-83D9-D1A6756B3CB9}" presName="rootText" presStyleLbl="node3" presStyleIdx="11" presStyleCnt="14">
         <dgm:presLayoutVars>
           <dgm:chPref val="3"/>
         </dgm:presLayoutVars>
@@ -6159,7 +6231,7 @@
       <dgm:spPr/>
     </dgm:pt>
     <dgm:pt modelId="{2C816549-9EE9-4756-A160-AC0E53C139B8}" type="pres">
-      <dgm:prSet presAssocID="{4DE3A42A-E3CE-4E99-83D9-D1A6756B3CB9}" presName="rootConnector" presStyleLbl="node3" presStyleIdx="10" presStyleCnt="13"/>
+      <dgm:prSet presAssocID="{4DE3A42A-E3CE-4E99-83D9-D1A6756B3CB9}" presName="rootConnector" presStyleLbl="node3" presStyleIdx="11" presStyleCnt="14"/>
       <dgm:spPr/>
     </dgm:pt>
     <dgm:pt modelId="{B4B577CE-F927-44B3-B73A-132AB0F7463E}" type="pres">
@@ -6315,7 +6387,7 @@
       <dgm:spPr/>
     </dgm:pt>
     <dgm:pt modelId="{98DF9615-6AB1-4615-98A9-227A4B3AE02B}" type="pres">
-      <dgm:prSet presAssocID="{AD5EE0EA-60D1-43DE-980D-E1501EFCEDE7}" presName="Name37" presStyleLbl="parChTrans1D3" presStyleIdx="11" presStyleCnt="13"/>
+      <dgm:prSet presAssocID="{AD5EE0EA-60D1-43DE-980D-E1501EFCEDE7}" presName="Name37" presStyleLbl="parChTrans1D3" presStyleIdx="12" presStyleCnt="14"/>
       <dgm:spPr/>
     </dgm:pt>
     <dgm:pt modelId="{F4F6AA9E-5CC7-4688-8E0A-DFFF2E2453E3}" type="pres">
@@ -6331,7 +6403,7 @@
       <dgm:spPr/>
     </dgm:pt>
     <dgm:pt modelId="{7A882588-0810-4F92-AD23-756B9035A4E8}" type="pres">
-      <dgm:prSet presAssocID="{197668C4-8212-48B8-A54E-73002176A9B9}" presName="rootText" presStyleLbl="node3" presStyleIdx="11" presStyleCnt="13">
+      <dgm:prSet presAssocID="{197668C4-8212-48B8-A54E-73002176A9B9}" presName="rootText" presStyleLbl="node3" presStyleIdx="12" presStyleCnt="14">
         <dgm:presLayoutVars>
           <dgm:chPref val="3"/>
         </dgm:presLayoutVars>
@@ -6339,7 +6411,7 @@
       <dgm:spPr/>
     </dgm:pt>
     <dgm:pt modelId="{241D6C5A-A704-4FEC-BFA2-42E7E1150593}" type="pres">
-      <dgm:prSet presAssocID="{197668C4-8212-48B8-A54E-73002176A9B9}" presName="rootConnector" presStyleLbl="node3" presStyleIdx="11" presStyleCnt="13"/>
+      <dgm:prSet presAssocID="{197668C4-8212-48B8-A54E-73002176A9B9}" presName="rootConnector" presStyleLbl="node3" presStyleIdx="12" presStyleCnt="14"/>
       <dgm:spPr/>
     </dgm:pt>
     <dgm:pt modelId="{1773CDB1-D2E3-4EAE-A42A-B036DC3596AE}" type="pres">
@@ -6351,7 +6423,7 @@
       <dgm:spPr/>
     </dgm:pt>
     <dgm:pt modelId="{B4023B61-E2B4-4C69-A00E-8B14067C6DC3}" type="pres">
-      <dgm:prSet presAssocID="{D672805F-D531-46CA-8240-38805655CA82}" presName="Name37" presStyleLbl="parChTrans1D3" presStyleIdx="12" presStyleCnt="13"/>
+      <dgm:prSet presAssocID="{D672805F-D531-46CA-8240-38805655CA82}" presName="Name37" presStyleLbl="parChTrans1D3" presStyleIdx="13" presStyleCnt="14"/>
       <dgm:spPr/>
     </dgm:pt>
     <dgm:pt modelId="{BBBC079C-B4BF-4ADF-8148-1298E67D0F08}" type="pres">
@@ -6367,7 +6439,7 @@
       <dgm:spPr/>
     </dgm:pt>
     <dgm:pt modelId="{B04C15FD-14A3-4E7B-895B-7C4AF0E8908C}" type="pres">
-      <dgm:prSet presAssocID="{5DF6C11B-377F-47FB-BC50-A7E3E32B7B43}" presName="rootText" presStyleLbl="node3" presStyleIdx="12" presStyleCnt="13">
+      <dgm:prSet presAssocID="{5DF6C11B-377F-47FB-BC50-A7E3E32B7B43}" presName="rootText" presStyleLbl="node3" presStyleIdx="13" presStyleCnt="14">
         <dgm:presLayoutVars>
           <dgm:chPref val="3"/>
         </dgm:presLayoutVars>
@@ -6375,7 +6447,7 @@
       <dgm:spPr/>
     </dgm:pt>
     <dgm:pt modelId="{D2420743-058E-43CD-8DE7-96F37C968137}" type="pres">
-      <dgm:prSet presAssocID="{5DF6C11B-377F-47FB-BC50-A7E3E32B7B43}" presName="rootConnector" presStyleLbl="node3" presStyleIdx="12" presStyleCnt="13"/>
+      <dgm:prSet presAssocID="{5DF6C11B-377F-47FB-BC50-A7E3E32B7B43}" presName="rootConnector" presStyleLbl="node3" presStyleIdx="13" presStyleCnt="14"/>
       <dgm:spPr/>
     </dgm:pt>
     <dgm:pt modelId="{0C86AA4C-1483-49E1-8C49-98CA315494B9}" type="pres">
@@ -6412,6 +6484,7 @@
     <dgm:cxn modelId="{78841D3B-011C-4F77-863D-764B0865371F}" type="presOf" srcId="{B829E806-E11E-4BDA-8589-5EF437FD4FD6}" destId="{940D3546-6031-400F-B1CF-0A05124CD0AE}" srcOrd="0" destOrd="0" presId="urn:microsoft.com/office/officeart/2005/8/layout/orgChart1"/>
     <dgm:cxn modelId="{EF5B123E-DF97-4A3E-8871-AAA083F0DF6B}" type="presOf" srcId="{D672805F-D531-46CA-8240-38805655CA82}" destId="{B4023B61-E2B4-4C69-A00E-8B14067C6DC3}" srcOrd="0" destOrd="0" presId="urn:microsoft.com/office/officeart/2005/8/layout/orgChart1"/>
     <dgm:cxn modelId="{83710E5D-5FD5-4794-8A4E-81F1DD87174C}" type="presOf" srcId="{5DF6C11B-377F-47FB-BC50-A7E3E32B7B43}" destId="{B04C15FD-14A3-4E7B-895B-7C4AF0E8908C}" srcOrd="0" destOrd="0" presId="urn:microsoft.com/office/officeart/2005/8/layout/orgChart1"/>
+    <dgm:cxn modelId="{3526BE46-DFD7-448B-BA56-4BF4E097739C}" type="presOf" srcId="{FBAC9C05-519A-4AB7-B985-D9BE1A39A0B1}" destId="{7BD205D8-B95D-44F8-9394-3A803C3AE7E3}" srcOrd="0" destOrd="0" presId="urn:microsoft.com/office/officeart/2005/8/layout/orgChart1"/>
     <dgm:cxn modelId="{3679A549-E1BF-4456-B75B-8BA78A97E6CE}" type="presOf" srcId="{4DE3A42A-E3CE-4E99-83D9-D1A6756B3CB9}" destId="{CC33A293-E3CB-411D-9632-6FE6954F9F3F}" srcOrd="0" destOrd="0" presId="urn:microsoft.com/office/officeart/2005/8/layout/orgChart1"/>
     <dgm:cxn modelId="{1D7CEA49-FBBA-4F7B-ACF8-330C48D879F8}" type="presOf" srcId="{57A8CB2D-79BE-4C74-9A37-D6A913DE1B82}" destId="{ED24999A-CB54-48D6-8528-2545D016E1D3}" srcOrd="0" destOrd="0" presId="urn:microsoft.com/office/officeart/2005/8/layout/orgChart1"/>
     <dgm:cxn modelId="{523F296D-2CC7-4C29-85F8-5468ED82EAEB}" srcId="{34BEB75E-ED6D-4113-9F50-1BF5F1954990}" destId="{441C9BFF-8AD7-4827-90F5-60BEDCAF3705}" srcOrd="0" destOrd="0" parTransId="{AED53F1B-6F52-4865-A6C0-13F7BB680C57}" sibTransId="{EE93340F-3E48-4F2C-8A92-4BB8BFF38136}"/>
@@ -6432,6 +6505,7 @@
     <dgm:cxn modelId="{22A03889-C31F-4932-9032-214B397B0A0F}" type="presOf" srcId="{305846AD-47C4-463B-9DBE-6AA8AAAFD9CA}" destId="{1B492F86-1603-4E21-B660-DA6307964BAD}" srcOrd="0" destOrd="0" presId="urn:microsoft.com/office/officeart/2005/8/layout/orgChart1"/>
     <dgm:cxn modelId="{8FFBDF89-5769-4DA0-89DA-2C34592C540B}" type="presOf" srcId="{3C6EA423-D64F-4DC7-B184-24C9BC3512E8}" destId="{6326AB10-BB5C-4854-9D21-95B3803C563E}" srcOrd="1" destOrd="0" presId="urn:microsoft.com/office/officeart/2005/8/layout/orgChart1"/>
     <dgm:cxn modelId="{5ECCA38B-6E25-44ED-A687-D20C973638AC}" type="presOf" srcId="{795061A3-2B93-41B7-8CB3-D2EA827D06F1}" destId="{6E5659B3-987D-47B1-A1A1-39AAF04C38E5}" srcOrd="0" destOrd="0" presId="urn:microsoft.com/office/officeart/2005/8/layout/orgChart1"/>
+    <dgm:cxn modelId="{A167778E-6A1B-4DA4-912C-72E3358785B4}" type="presOf" srcId="{579C73EA-AC1B-47D0-8426-C21255916998}" destId="{CD070373-8DF7-435C-92DB-D4837DF76FC3}" srcOrd="0" destOrd="0" presId="urn:microsoft.com/office/officeart/2005/8/layout/orgChart1"/>
     <dgm:cxn modelId="{96A74491-5C5F-47EE-80D2-0B4E847CFBE4}" type="presOf" srcId="{967C17FD-B87B-4CD0-BD44-345E2E5D2EA3}" destId="{E4F616C8-77CD-4807-B795-EDC2BC3DD8F2}" srcOrd="0" destOrd="0" presId="urn:microsoft.com/office/officeart/2005/8/layout/orgChart1"/>
     <dgm:cxn modelId="{C81E8C91-5EF5-45E9-ACD4-E449A9809B80}" srcId="{1924ECD5-AA0E-4B54-9424-D53165043932}" destId="{305846AD-47C4-463B-9DBE-6AA8AAAFD9CA}" srcOrd="3" destOrd="0" parTransId="{57A8CB2D-79BE-4C74-9A37-D6A913DE1B82}" sibTransId="{6A058D6F-D207-4F81-A3FF-D70611BE6534}"/>
     <dgm:cxn modelId="{A3F6D991-5237-4FEF-9535-02A35ACB4BCB}" type="presOf" srcId="{34BEB75E-ED6D-4113-9F50-1BF5F1954990}" destId="{5F3FAA4C-44A3-470C-81C5-23BB7113FF75}" srcOrd="0" destOrd="0" presId="urn:microsoft.com/office/officeart/2005/8/layout/orgChart1"/>
@@ -6471,6 +6545,8 @@
     <dgm:cxn modelId="{714EDCCA-D136-47E8-93E3-18AD130D9A96}" type="presOf" srcId="{347BA63F-6330-4E17-9091-C819304D8374}" destId="{42DEE17A-3D83-4C0D-B91C-CA141A292DA2}" srcOrd="1" destOrd="0" presId="urn:microsoft.com/office/officeart/2005/8/layout/orgChart1"/>
     <dgm:cxn modelId="{105FF0CA-A9FE-4385-849A-513AFC6AB6C4}" type="presOf" srcId="{A1698A36-C129-4FA1-BE7D-9B591DCFED6F}" destId="{EA35908A-375B-4EF7-A17D-476DA652899F}" srcOrd="0" destOrd="0" presId="urn:microsoft.com/office/officeart/2005/8/layout/orgChart1"/>
     <dgm:cxn modelId="{A894B2CE-042B-4933-973A-0F0987339BD2}" type="presOf" srcId="{10F04DDC-9425-470F-8153-E7CB032EC473}" destId="{274E767F-761A-4B30-B369-389DF89B937D}" srcOrd="1" destOrd="0" presId="urn:microsoft.com/office/officeart/2005/8/layout/orgChart1"/>
+    <dgm:cxn modelId="{463373CF-273F-40C2-95CE-CC20F6B4CA8A}" type="presOf" srcId="{FBAC9C05-519A-4AB7-B985-D9BE1A39A0B1}" destId="{390062A8-6670-4F37-9397-41D8E8C03E2B}" srcOrd="1" destOrd="0" presId="urn:microsoft.com/office/officeart/2005/8/layout/orgChart1"/>
+    <dgm:cxn modelId="{FD077AD2-0BF3-4EFB-91F6-46E700E229BB}" srcId="{44363CFA-628E-4026-88F3-8868490E44F8}" destId="{FBAC9C05-519A-4AB7-B985-D9BE1A39A0B1}" srcOrd="0" destOrd="0" parTransId="{579C73EA-AC1B-47D0-8426-C21255916998}" sibTransId="{C09F2730-84BE-44BA-B0A5-5D57ACB94EC0}"/>
     <dgm:cxn modelId="{A59B17D5-B98F-4D2B-8FCB-DE732988D245}" type="presOf" srcId="{332EBDA1-FC91-42DD-8C1E-2C7B445019B3}" destId="{1F530FFE-35D1-4609-8D1C-CEEB0EF8690E}" srcOrd="1" destOrd="0" presId="urn:microsoft.com/office/officeart/2005/8/layout/orgChart1"/>
     <dgm:cxn modelId="{C0EFEBD5-5DF4-4D4F-8FE8-1BE15E6AF913}" type="presOf" srcId="{DE023E0B-5C31-4E35-A101-3DA3908C072F}" destId="{F5DA5587-5EB1-405E-8951-92F671AE6BE5}" srcOrd="1" destOrd="0" presId="urn:microsoft.com/office/officeart/2005/8/layout/orgChart1"/>
     <dgm:cxn modelId="{EF32A5D6-A7ED-472E-846C-E4C37BA3F657}" type="presOf" srcId="{785ADFEC-7668-46D6-9578-5377B24474CF}" destId="{B15B783C-17E1-46DC-B52E-C2A7EDCDDBF6}" srcOrd="0" destOrd="0" presId="urn:microsoft.com/office/officeart/2005/8/layout/orgChart1"/>
@@ -6531,6 +6607,13 @@
     <dgm:cxn modelId="{53FD0442-F118-460F-96D9-B19FF2646F31}" type="presParOf" srcId="{82990AE5-EA67-44AF-B5C7-812F8D1B493B}" destId="{2D05126F-7CA9-467A-B341-F8E1AF5FCF66}" srcOrd="0" destOrd="0" presId="urn:microsoft.com/office/officeart/2005/8/layout/orgChart1"/>
     <dgm:cxn modelId="{22B6FF1F-5A87-48FA-BF0E-721F5C159B60}" type="presParOf" srcId="{82990AE5-EA67-44AF-B5C7-812F8D1B493B}" destId="{9C340236-4FFD-45ED-9EE1-A04737FABAE4}" srcOrd="1" destOrd="0" presId="urn:microsoft.com/office/officeart/2005/8/layout/orgChart1"/>
     <dgm:cxn modelId="{19C0CCED-B244-4718-BDE1-8BEEF1A02086}" type="presParOf" srcId="{80FD1344-699F-4451-B64E-18964A3F14D0}" destId="{DE4A9740-7D9B-4A7D-9A6A-26B43F1C9054}" srcOrd="1" destOrd="0" presId="urn:microsoft.com/office/officeart/2005/8/layout/orgChart1"/>
+    <dgm:cxn modelId="{FB14FAC1-70AE-41E9-BBEE-73E8742EF163}" type="presParOf" srcId="{DE4A9740-7D9B-4A7D-9A6A-26B43F1C9054}" destId="{CD070373-8DF7-435C-92DB-D4837DF76FC3}" srcOrd="0" destOrd="0" presId="urn:microsoft.com/office/officeart/2005/8/layout/orgChart1"/>
+    <dgm:cxn modelId="{13C7FF00-EEEB-4F17-A7B8-6CA9080BD2E2}" type="presParOf" srcId="{DE4A9740-7D9B-4A7D-9A6A-26B43F1C9054}" destId="{57A23413-0351-4B01-B143-DF45D03C6A89}" srcOrd="1" destOrd="0" presId="urn:microsoft.com/office/officeart/2005/8/layout/orgChart1"/>
+    <dgm:cxn modelId="{3BB540AB-2C01-4A55-B0CB-E1CDE3D7D9D6}" type="presParOf" srcId="{57A23413-0351-4B01-B143-DF45D03C6A89}" destId="{43C637BB-C0F7-48B7-BCB5-4C46ED31DC73}" srcOrd="0" destOrd="0" presId="urn:microsoft.com/office/officeart/2005/8/layout/orgChart1"/>
+    <dgm:cxn modelId="{FF3B6EB9-1C3C-4A0A-8453-5931A18BA805}" type="presParOf" srcId="{43C637BB-C0F7-48B7-BCB5-4C46ED31DC73}" destId="{7BD205D8-B95D-44F8-9394-3A803C3AE7E3}" srcOrd="0" destOrd="0" presId="urn:microsoft.com/office/officeart/2005/8/layout/orgChart1"/>
+    <dgm:cxn modelId="{5F9AA71A-D504-43F1-B323-CA14BFF1C4EB}" type="presParOf" srcId="{43C637BB-C0F7-48B7-BCB5-4C46ED31DC73}" destId="{390062A8-6670-4F37-9397-41D8E8C03E2B}" srcOrd="1" destOrd="0" presId="urn:microsoft.com/office/officeart/2005/8/layout/orgChart1"/>
+    <dgm:cxn modelId="{717BB828-5A3C-470F-9512-5EF58DE46E49}" type="presParOf" srcId="{57A23413-0351-4B01-B143-DF45D03C6A89}" destId="{093E2217-0455-4C34-BA46-E099CA2EAF49}" srcOrd="1" destOrd="0" presId="urn:microsoft.com/office/officeart/2005/8/layout/orgChart1"/>
+    <dgm:cxn modelId="{DBA4B4E4-9B9C-4504-A025-82620C90E960}" type="presParOf" srcId="{57A23413-0351-4B01-B143-DF45D03C6A89}" destId="{2EF7E96D-2F1E-468B-90A0-927051DAC862}" srcOrd="2" destOrd="0" presId="urn:microsoft.com/office/officeart/2005/8/layout/orgChart1"/>
     <dgm:cxn modelId="{48FAAEDA-3439-480E-AF63-59AAA8EED615}" type="presParOf" srcId="{80FD1344-699F-4451-B64E-18964A3F14D0}" destId="{2B358511-A0D0-46D9-8267-856248CA4EE9}" srcOrd="2" destOrd="0" presId="urn:microsoft.com/office/officeart/2005/8/layout/orgChart1"/>
     <dgm:cxn modelId="{31FFA8EA-F7CF-48D2-9107-5B5EC9ABF3E3}" type="presParOf" srcId="{E4F35EED-3168-4BAF-B012-BC20D796120D}" destId="{F2FC5845-76F4-45FC-9102-1D5405CED484}" srcOrd="6" destOrd="0" presId="urn:microsoft.com/office/officeart/2005/8/layout/orgChart1"/>
     <dgm:cxn modelId="{C959F902-64C2-4EEA-9450-7D68CF149FCB}" type="presParOf" srcId="{E4F35EED-3168-4BAF-B012-BC20D796120D}" destId="{B4B6317A-15CF-41A3-8884-996C77B54179}" srcOrd="7" destOrd="0" presId="urn:microsoft.com/office/officeart/2005/8/layout/orgChart1"/>
@@ -10236,6 +10319,65 @@
         <a:fontRef idx="minor"/>
       </dsp:style>
     </dsp:sp>
+    <dsp:sp modelId="{CD070373-8DF7-435C-92DB-D4837DF76FC3}">
+      <dsp:nvSpPr>
+        <dsp:cNvPr id="0" name=""/>
+        <dsp:cNvSpPr/>
+      </dsp:nvSpPr>
+      <dsp:spPr>
+        <a:xfrm>
+          <a:off x="3362883" y="1344513"/>
+          <a:ext cx="166315" cy="510033"/>
+        </a:xfrm>
+        <a:custGeom>
+          <a:avLst/>
+          <a:gdLst/>
+          <a:ahLst/>
+          <a:cxnLst/>
+          <a:rect l="0" t="0" r="0" b="0"/>
+          <a:pathLst>
+            <a:path>
+              <a:moveTo>
+                <a:pt x="0" y="0"/>
+              </a:moveTo>
+              <a:lnTo>
+                <a:pt x="0" y="510033"/>
+              </a:lnTo>
+              <a:lnTo>
+                <a:pt x="166315" y="510033"/>
+              </a:lnTo>
+            </a:path>
+          </a:pathLst>
+        </a:custGeom>
+        <a:noFill/>
+        <a:ln w="12700" cap="flat" cmpd="sng" algn="ctr">
+          <a:solidFill>
+            <a:schemeClr val="accent1">
+              <a:shade val="80000"/>
+              <a:hueOff val="0"/>
+              <a:satOff val="0"/>
+              <a:lumOff val="0"/>
+              <a:alphaOff val="0"/>
+            </a:schemeClr>
+          </a:solidFill>
+          <a:prstDash val="solid"/>
+          <a:miter lim="800000"/>
+        </a:ln>
+        <a:effectLst/>
+      </dsp:spPr>
+      <dsp:style>
+        <a:lnRef idx="2">
+          <a:scrgbClr r="0" g="0" b="0"/>
+        </a:lnRef>
+        <a:fillRef idx="0">
+          <a:scrgbClr r="0" g="0" b="0"/>
+        </a:fillRef>
+        <a:effectRef idx="0">
+          <a:scrgbClr r="0" g="0" b="0"/>
+        </a:effectRef>
+        <a:fontRef idx="minor"/>
+      </dsp:style>
+    </dsp:sp>
     <dsp:sp modelId="{F92D201F-4429-48F2-A613-5C474A994CD9}">
       <dsp:nvSpPr>
         <dsp:cNvPr id="0" name=""/>
@@ -11005,6 +11147,84 @@
       </dsp:txBody>
       <dsp:txXfrm>
         <a:off x="3252006" y="790128"/>
+        <a:ext cx="1108769" cy="554384"/>
+      </dsp:txXfrm>
+    </dsp:sp>
+    <dsp:sp modelId="{7BD205D8-B95D-44F8-9394-3A803C3AE7E3}">
+      <dsp:nvSpPr>
+        <dsp:cNvPr id="0" name=""/>
+        <dsp:cNvSpPr/>
+      </dsp:nvSpPr>
+      <dsp:spPr>
+        <a:xfrm>
+          <a:off x="3529198" y="1577354"/>
+          <a:ext cx="1108769" cy="554384"/>
+        </a:xfrm>
+        <a:prstGeom prst="rect">
+          <a:avLst/>
+        </a:prstGeom>
+        <a:solidFill>
+          <a:schemeClr val="accent1">
+            <a:hueOff val="0"/>
+            <a:satOff val="0"/>
+            <a:lumOff val="0"/>
+            <a:alphaOff val="0"/>
+          </a:schemeClr>
+        </a:solidFill>
+        <a:ln w="12700" cap="flat" cmpd="sng" algn="ctr">
+          <a:solidFill>
+            <a:schemeClr val="lt1">
+              <a:hueOff val="0"/>
+              <a:satOff val="0"/>
+              <a:lumOff val="0"/>
+              <a:alphaOff val="0"/>
+            </a:schemeClr>
+          </a:solidFill>
+          <a:prstDash val="solid"/>
+          <a:miter lim="800000"/>
+        </a:ln>
+        <a:effectLst/>
+      </dsp:spPr>
+      <dsp:style>
+        <a:lnRef idx="2">
+          <a:scrgbClr r="0" g="0" b="0"/>
+        </a:lnRef>
+        <a:fillRef idx="1">
+          <a:scrgbClr r="0" g="0" b="0"/>
+        </a:fillRef>
+        <a:effectRef idx="0">
+          <a:scrgbClr r="0" g="0" b="0"/>
+        </a:effectRef>
+        <a:fontRef idx="minor">
+          <a:schemeClr val="lt1"/>
+        </a:fontRef>
+      </dsp:style>
+      <dsp:txBody>
+        <a:bodyPr spcFirstLastPara="0" vert="horz" wrap="square" lIns="5080" tIns="5080" rIns="5080" bIns="5080" numCol="1" spcCol="1270" anchor="ctr" anchorCtr="0">
+          <a:noAutofit/>
+        </a:bodyPr>
+        <a:lstStyle/>
+        <a:p>
+          <a:pPr marL="0" lvl="0" indent="0" algn="ctr" defTabSz="355600">
+            <a:lnSpc>
+              <a:spcPct val="90000"/>
+            </a:lnSpc>
+            <a:spcBef>
+              <a:spcPct val="0"/>
+            </a:spcBef>
+            <a:spcAft>
+              <a:spcPct val="35000"/>
+            </a:spcAft>
+            <a:buNone/>
+          </a:pPr>
+          <a:r>
+            <a:rPr lang="en-PH" sz="800" i="0" u="none" kern="1200" dirty="0"/>
+            <a:t>GET: /home/search/&lt;search&gt;</a:t>
+          </a:r>
+        </a:p>
+      </dsp:txBody>
+      <dsp:txXfrm>
+        <a:off x="3529198" y="1577354"/>
         <a:ext cx="1108769" cy="554384"/>
       </dsp:txXfrm>
     </dsp:sp>
@@ -26011,7 +26231,7 @@
           <a:p>
             <a:fld id="{2CDD62A0-B891-4650-A5BB-561AD783AD7C}" type="datetimeFigureOut">
               <a:rPr lang="en-PH" smtClean="0"/>
-              <a:t>30/05/2022</a:t>
+              <a:t>01/06/2022</a:t>
             </a:fld>
             <a:endParaRPr lang="en-PH"/>
           </a:p>
@@ -26211,7 +26431,7 @@
           <a:p>
             <a:fld id="{2CDD62A0-B891-4650-A5BB-561AD783AD7C}" type="datetimeFigureOut">
               <a:rPr lang="en-PH" smtClean="0"/>
-              <a:t>30/05/2022</a:t>
+              <a:t>01/06/2022</a:t>
             </a:fld>
             <a:endParaRPr lang="en-PH"/>
           </a:p>
@@ -26421,7 +26641,7 @@
           <a:p>
             <a:fld id="{2CDD62A0-B891-4650-A5BB-561AD783AD7C}" type="datetimeFigureOut">
               <a:rPr lang="en-PH" smtClean="0"/>
-              <a:t>30/05/2022</a:t>
+              <a:t>01/06/2022</a:t>
             </a:fld>
             <a:endParaRPr lang="en-PH"/>
           </a:p>
@@ -26621,7 +26841,7 @@
           <a:p>
             <a:fld id="{2CDD62A0-B891-4650-A5BB-561AD783AD7C}" type="datetimeFigureOut">
               <a:rPr lang="en-PH" smtClean="0"/>
-              <a:t>30/05/2022</a:t>
+              <a:t>01/06/2022</a:t>
             </a:fld>
             <a:endParaRPr lang="en-PH"/>
           </a:p>
@@ -26897,7 +27117,7 @@
           <a:p>
             <a:fld id="{2CDD62A0-B891-4650-A5BB-561AD783AD7C}" type="datetimeFigureOut">
               <a:rPr lang="en-PH" smtClean="0"/>
-              <a:t>30/05/2022</a:t>
+              <a:t>01/06/2022</a:t>
             </a:fld>
             <a:endParaRPr lang="en-PH"/>
           </a:p>
@@ -27165,7 +27385,7 @@
           <a:p>
             <a:fld id="{2CDD62A0-B891-4650-A5BB-561AD783AD7C}" type="datetimeFigureOut">
               <a:rPr lang="en-PH" smtClean="0"/>
-              <a:t>30/05/2022</a:t>
+              <a:t>01/06/2022</a:t>
             </a:fld>
             <a:endParaRPr lang="en-PH"/>
           </a:p>
@@ -27580,7 +27800,7 @@
           <a:p>
             <a:fld id="{2CDD62A0-B891-4650-A5BB-561AD783AD7C}" type="datetimeFigureOut">
               <a:rPr lang="en-PH" smtClean="0"/>
-              <a:t>30/05/2022</a:t>
+              <a:t>01/06/2022</a:t>
             </a:fld>
             <a:endParaRPr lang="en-PH"/>
           </a:p>
@@ -27722,7 +27942,7 @@
           <a:p>
             <a:fld id="{2CDD62A0-B891-4650-A5BB-561AD783AD7C}" type="datetimeFigureOut">
               <a:rPr lang="en-PH" smtClean="0"/>
-              <a:t>30/05/2022</a:t>
+              <a:t>01/06/2022</a:t>
             </a:fld>
             <a:endParaRPr lang="en-PH"/>
           </a:p>
@@ -27835,7 +28055,7 @@
           <a:p>
             <a:fld id="{2CDD62A0-B891-4650-A5BB-561AD783AD7C}" type="datetimeFigureOut">
               <a:rPr lang="en-PH" smtClean="0"/>
-              <a:t>30/05/2022</a:t>
+              <a:t>01/06/2022</a:t>
             </a:fld>
             <a:endParaRPr lang="en-PH"/>
           </a:p>
@@ -28148,7 +28368,7 @@
           <a:p>
             <a:fld id="{2CDD62A0-B891-4650-A5BB-561AD783AD7C}" type="datetimeFigureOut">
               <a:rPr lang="en-PH" smtClean="0"/>
-              <a:t>30/05/2022</a:t>
+              <a:t>01/06/2022</a:t>
             </a:fld>
             <a:endParaRPr lang="en-PH"/>
           </a:p>
@@ -28437,7 +28657,7 @@
           <a:p>
             <a:fld id="{2CDD62A0-B891-4650-A5BB-561AD783AD7C}" type="datetimeFigureOut">
               <a:rPr lang="en-PH" smtClean="0"/>
-              <a:t>30/05/2022</a:t>
+              <a:t>01/06/2022</a:t>
             </a:fld>
             <a:endParaRPr lang="en-PH"/>
           </a:p>
@@ -28680,7 +28900,7 @@
           <a:p>
             <a:fld id="{2CDD62A0-B891-4650-A5BB-561AD783AD7C}" type="datetimeFigureOut">
               <a:rPr lang="en-PH" smtClean="0"/>
-              <a:t>30/05/2022</a:t>
+              <a:t>01/06/2022</a:t>
             </a:fld>
             <a:endParaRPr lang="en-PH"/>
           </a:p>
@@ -29382,7 +29602,7 @@
             <p:ph idx="1"/>
             <p:extLst>
               <p:ext uri="{D42A27DB-BD31-4B8C-83A1-F6EECF244321}">
-                <p14:modId xmlns:p14="http://schemas.microsoft.com/office/powerpoint/2010/main" val="2785262154"/>
+                <p14:modId xmlns:p14="http://schemas.microsoft.com/office/powerpoint/2010/main" val="2002842890"/>
               </p:ext>
             </p:extLst>
           </p:nvPr>

</xml_diff>